<commit_message>
update eda for disk 1
</commit_message>
<xml_diff>
--- a/presentation/Intro2AI.pptx
+++ b/presentation/Intro2AI.pptx
@@ -11,11 +11,11 @@
     <p:sldId id="258" r:id="rId2"/>
     <p:sldId id="364" r:id="rId3"/>
     <p:sldId id="256" r:id="rId4"/>
-    <p:sldId id="368" r:id="rId5"/>
+    <p:sldId id="365" r:id="rId5"/>
     <p:sldId id="369" r:id="rId6"/>
-    <p:sldId id="365" r:id="rId7"/>
-    <p:sldId id="366" r:id="rId8"/>
-    <p:sldId id="367" r:id="rId9"/>
+    <p:sldId id="367" r:id="rId7"/>
+    <p:sldId id="370" r:id="rId8"/>
+    <p:sldId id="366" r:id="rId9"/>
   </p:sldIdLst>
   <p:sldSz cx="12192000" cy="6858000"/>
   <p:notesSz cx="6858000" cy="9144000"/>
@@ -114,6 +114,11 @@
       </a:defRPr>
     </a:lvl9pPr>
   </p:defaultTextStyle>
+  <p:extLst>
+    <p:ext uri="{EFAFB233-063F-42B5-8137-9DF3F51BA10A}">
+      <p15:sldGuideLst xmlns:p15="http://schemas.microsoft.com/office/powerpoint/2012/main"/>
+    </p:ext>
+  </p:extLst>
 </p:presentation>
 </file>
 
@@ -199,7 +204,7 @@
           <a:p>
             <a:fld id="{0A554CF5-510C-4E4A-AA8E-3A8696C8EFB8}" type="datetimeFigureOut">
               <a:rPr lang="en-US" smtClean="0"/>
-              <a:t>11/28/2024</a:t>
+              <a:t>11/29/2024</a:t>
             </a:fld>
             <a:endParaRPr lang="en-US"/>
           </a:p>
@@ -816,7 +821,7 @@
           <a:p>
             <a:fld id="{C5B5CAEF-8618-4428-899F-632472BB9095}" type="datetimeFigureOut">
               <a:rPr lang="en-US" smtClean="0"/>
-              <a:t>11/28/2024</a:t>
+              <a:t>11/29/2024</a:t>
             </a:fld>
             <a:endParaRPr lang="en-US"/>
           </a:p>
@@ -1014,7 +1019,7 @@
           <a:p>
             <a:fld id="{C5B5CAEF-8618-4428-899F-632472BB9095}" type="datetimeFigureOut">
               <a:rPr lang="en-US" smtClean="0"/>
-              <a:t>11/28/2024</a:t>
+              <a:t>11/29/2024</a:t>
             </a:fld>
             <a:endParaRPr lang="en-US"/>
           </a:p>
@@ -1222,7 +1227,7 @@
           <a:p>
             <a:fld id="{C5B5CAEF-8618-4428-899F-632472BB9095}" type="datetimeFigureOut">
               <a:rPr lang="en-US" smtClean="0"/>
-              <a:t>11/28/2024</a:t>
+              <a:t>11/29/2024</a:t>
             </a:fld>
             <a:endParaRPr lang="en-US"/>
           </a:p>
@@ -2938,7 +2943,7 @@
           <a:p>
             <a:fld id="{8920D2FD-0E92-484C-A245-58BC3393C134}" type="datetime1">
               <a:rPr lang="en-US" noProof="0" smtClean="0"/>
-              <a:t>11/28/2024</a:t>
+              <a:t>11/29/2024</a:t>
             </a:fld>
             <a:endParaRPr lang="en-US" noProof="0" dirty="0"/>
           </a:p>
@@ -3930,7 +3935,7 @@
           <a:p>
             <a:fld id="{8920D2FD-0E92-484C-A245-58BC3393C134}" type="datetime1">
               <a:rPr lang="en-US" noProof="0" smtClean="0"/>
-              <a:t>11/28/2024</a:t>
+              <a:t>11/29/2024</a:t>
             </a:fld>
             <a:endParaRPr lang="en-US" noProof="0" dirty="0"/>
           </a:p>
@@ -9871,7 +9876,7 @@
           <a:p>
             <a:fld id="{C5B5CAEF-8618-4428-899F-632472BB9095}" type="datetimeFigureOut">
               <a:rPr lang="en-US" smtClean="0"/>
-              <a:t>11/28/2024</a:t>
+              <a:t>11/29/2024</a:t>
             </a:fld>
             <a:endParaRPr lang="en-US"/>
           </a:p>
@@ -10146,7 +10151,7 @@
           <a:p>
             <a:fld id="{C5B5CAEF-8618-4428-899F-632472BB9095}" type="datetimeFigureOut">
               <a:rPr lang="en-US" smtClean="0"/>
-              <a:t>11/28/2024</a:t>
+              <a:t>11/29/2024</a:t>
             </a:fld>
             <a:endParaRPr lang="en-US"/>
           </a:p>
@@ -10411,7 +10416,7 @@
           <a:p>
             <a:fld id="{C5B5CAEF-8618-4428-899F-632472BB9095}" type="datetimeFigureOut">
               <a:rPr lang="en-US" smtClean="0"/>
-              <a:t>11/28/2024</a:t>
+              <a:t>11/29/2024</a:t>
             </a:fld>
             <a:endParaRPr lang="en-US"/>
           </a:p>
@@ -10823,7 +10828,7 @@
           <a:p>
             <a:fld id="{C5B5CAEF-8618-4428-899F-632472BB9095}" type="datetimeFigureOut">
               <a:rPr lang="en-US" smtClean="0"/>
-              <a:t>11/28/2024</a:t>
+              <a:t>11/29/2024</a:t>
             </a:fld>
             <a:endParaRPr lang="en-US"/>
           </a:p>
@@ -10964,7 +10969,7 @@
           <a:p>
             <a:fld id="{C5B5CAEF-8618-4428-899F-632472BB9095}" type="datetimeFigureOut">
               <a:rPr lang="en-US" smtClean="0"/>
-              <a:t>11/28/2024</a:t>
+              <a:t>11/29/2024</a:t>
             </a:fld>
             <a:endParaRPr lang="en-US"/>
           </a:p>
@@ -11077,7 +11082,7 @@
           <a:p>
             <a:fld id="{C5B5CAEF-8618-4428-899F-632472BB9095}" type="datetimeFigureOut">
               <a:rPr lang="en-US" smtClean="0"/>
-              <a:t>11/28/2024</a:t>
+              <a:t>11/29/2024</a:t>
             </a:fld>
             <a:endParaRPr lang="en-US"/>
           </a:p>
@@ -11388,7 +11393,7 @@
           <a:p>
             <a:fld id="{C5B5CAEF-8618-4428-899F-632472BB9095}" type="datetimeFigureOut">
               <a:rPr lang="en-US" smtClean="0"/>
-              <a:t>11/28/2024</a:t>
+              <a:t>11/29/2024</a:t>
             </a:fld>
             <a:endParaRPr lang="en-US"/>
           </a:p>
@@ -11676,7 +11681,7 @@
           <a:p>
             <a:fld id="{C5B5CAEF-8618-4428-899F-632472BB9095}" type="datetimeFigureOut">
               <a:rPr lang="en-US" smtClean="0"/>
-              <a:t>11/28/2024</a:t>
+              <a:t>11/29/2024</a:t>
             </a:fld>
             <a:endParaRPr lang="en-US"/>
           </a:p>
@@ -11917,7 +11922,7 @@
           <a:p>
             <a:fld id="{C5B5CAEF-8618-4428-899F-632472BB9095}" type="datetimeFigureOut">
               <a:rPr lang="en-US" smtClean="0"/>
-              <a:t>11/28/2024</a:t>
+              <a:t>11/29/2024</a:t>
             </a:fld>
             <a:endParaRPr lang="en-US"/>
           </a:p>
@@ -12664,7 +12669,7 @@
           <p:cNvPr id="2" name="Title 1">
             <a:extLst>
               <a:ext uri="{FF2B5EF4-FFF2-40B4-BE49-F238E27FC236}">
-                <a16:creationId xmlns:a16="http://schemas.microsoft.com/office/drawing/2014/main" id="{6729F9DD-A255-BCB7-5A65-572158A6550F}"/>
+                <a16:creationId xmlns:a16="http://schemas.microsoft.com/office/drawing/2014/main" id="{F998DE6D-E48C-5783-0598-429061A3D111}"/>
               </a:ext>
             </a:extLst>
           </p:cNvPr>
@@ -12680,43 +12685,63 @@
           <a:bodyPr/>
           <a:lstStyle/>
           <a:p>
-            <a:endParaRPr lang="en-US"/>
+            <a:r>
+              <a:rPr lang="en-US" dirty="0"/>
+              <a:t>Menu</a:t>
+            </a:r>
           </a:p>
         </p:txBody>
       </p:sp>
-      <p:pic>
-        <p:nvPicPr>
-          <p:cNvPr id="5" name="Content Placeholder 4">
+      <p:sp>
+        <p:nvSpPr>
+          <p:cNvPr id="3" name="Content Placeholder 2">
             <a:extLst>
               <a:ext uri="{FF2B5EF4-FFF2-40B4-BE49-F238E27FC236}">
-                <a16:creationId xmlns:a16="http://schemas.microsoft.com/office/drawing/2014/main" id="{8B2FAE3F-9888-76C5-1D85-57F1C816853A}"/>
+                <a16:creationId xmlns:a16="http://schemas.microsoft.com/office/drawing/2014/main" id="{0432FED2-B56A-67E8-E315-AE1157B75053}"/>
               </a:ext>
             </a:extLst>
           </p:cNvPr>
-          <p:cNvPicPr>
-            <a:picLocks noGrp="1" noChangeAspect="1"/>
-          </p:cNvPicPr>
+          <p:cNvSpPr>
+            <a:spLocks noGrp="1"/>
+          </p:cNvSpPr>
           <p:nvPr>
             <p:ph idx="1"/>
           </p:nvPr>
-        </p:nvPicPr>
-        <p:blipFill>
-          <a:blip r:embed="rId2"/>
-          <a:stretch>
-            <a:fillRect/>
-          </a:stretch>
-        </p:blipFill>
-        <p:spPr>
-          <a:xfrm>
-            <a:off x="1455916" y="1825625"/>
-            <a:ext cx="9280168" cy="4351338"/>
-          </a:xfrm>
-        </p:spPr>
-      </p:pic>
+        </p:nvSpPr>
+        <p:spPr/>
+        <p:txBody>
+          <a:bodyPr/>
+          <a:lstStyle/>
+          <a:p>
+            <a:r>
+              <a:rPr lang="en-US" dirty="0"/>
+              <a:t>Supervised Learning</a:t>
+            </a:r>
+          </a:p>
+          <a:p>
+            <a:r>
+              <a:rPr lang="en-US" dirty="0"/>
+              <a:t>Unsupervised Learning</a:t>
+            </a:r>
+          </a:p>
+          <a:p>
+            <a:r>
+              <a:rPr lang="en-US" dirty="0"/>
+              <a:t>Neural Networks </a:t>
+            </a:r>
+          </a:p>
+          <a:p>
+            <a:r>
+              <a:rPr lang="en-US" dirty="0"/>
+              <a:t>Generative AI</a:t>
+            </a:r>
+          </a:p>
+        </p:txBody>
+      </p:sp>
     </p:spTree>
     <p:extLst>
       <p:ext uri="{BB962C8B-B14F-4D97-AF65-F5344CB8AC3E}">
-        <p14:creationId xmlns:p14="http://schemas.microsoft.com/office/powerpoint/2010/main" val="2934740863"/>
+        <p14:creationId xmlns:p14="http://schemas.microsoft.com/office/powerpoint/2010/main" val="1229818231"/>
       </p:ext>
     </p:extLst>
   </p:cSld>
@@ -12822,7 +12847,7 @@
         </p:blipFill>
         <p:spPr bwMode="auto">
           <a:xfrm>
-            <a:off x="4756485" y="-96252"/>
+            <a:off x="2792075" y="-30384"/>
             <a:ext cx="6858000" cy="6858000"/>
           </a:xfrm>
           <a:prstGeom prst="rect">
@@ -12875,7 +12900,7 @@
           <p:cNvPr id="2" name="Title 1">
             <a:extLst>
               <a:ext uri="{FF2B5EF4-FFF2-40B4-BE49-F238E27FC236}">
-                <a16:creationId xmlns:a16="http://schemas.microsoft.com/office/drawing/2014/main" id="{F998DE6D-E48C-5783-0598-429061A3D111}"/>
+                <a16:creationId xmlns:a16="http://schemas.microsoft.com/office/drawing/2014/main" id="{A8461F53-1E38-71CA-F676-79C5232E4B8B}"/>
               </a:ext>
             </a:extLst>
           </p:cNvPr>
@@ -12893,7 +12918,7 @@
           <a:p>
             <a:r>
               <a:rPr lang="en-US" dirty="0"/>
-              <a:t>Menu</a:t>
+              <a:t>Glossary</a:t>
             </a:r>
           </a:p>
         </p:txBody>
@@ -12903,7 +12928,7 @@
           <p:cNvPr id="3" name="Content Placeholder 2">
             <a:extLst>
               <a:ext uri="{FF2B5EF4-FFF2-40B4-BE49-F238E27FC236}">
-                <a16:creationId xmlns:a16="http://schemas.microsoft.com/office/drawing/2014/main" id="{0432FED2-B56A-67E8-E315-AE1157B75053}"/>
+                <a16:creationId xmlns:a16="http://schemas.microsoft.com/office/drawing/2014/main" id="{432D617C-D403-7676-823A-265B78F86BE8}"/>
               </a:ext>
             </a:extLst>
           </p:cNvPr>
@@ -12921,33 +12946,41 @@
           <a:p>
             <a:r>
               <a:rPr lang="en-US" dirty="0"/>
-              <a:t>Supervised Learning</a:t>
+              <a:t>Goal: Regression, Classification, </a:t>
             </a:r>
+            <a:r>
+              <a:rPr lang="en-US" dirty="0" err="1"/>
+              <a:t>etc</a:t>
+            </a:r>
+            <a:endParaRPr lang="en-US" dirty="0"/>
           </a:p>
           <a:p>
             <a:r>
               <a:rPr lang="en-US" dirty="0"/>
-              <a:t>Unsupervised Learning</a:t>
+              <a:t>Objective Function</a:t>
             </a:r>
           </a:p>
           <a:p>
             <a:r>
               <a:rPr lang="en-US" dirty="0"/>
-              <a:t>Neural Networks </a:t>
+              <a:t>Gradient Descent </a:t>
             </a:r>
           </a:p>
           <a:p>
             <a:r>
               <a:rPr lang="en-US" dirty="0"/>
-              <a:t>Generative AI</a:t>
+              <a:t>Validation</a:t>
             </a:r>
+          </a:p>
+          <a:p>
+            <a:endParaRPr lang="en-US" dirty="0"/>
           </a:p>
         </p:txBody>
       </p:sp>
     </p:spTree>
     <p:extLst>
       <p:ext uri="{BB962C8B-B14F-4D97-AF65-F5344CB8AC3E}">
-        <p14:creationId xmlns:p14="http://schemas.microsoft.com/office/powerpoint/2010/main" val="1229818231"/>
+        <p14:creationId xmlns:p14="http://schemas.microsoft.com/office/powerpoint/2010/main" val="697072991"/>
       </p:ext>
     </p:extLst>
   </p:cSld>
@@ -12958,6 +12991,199 @@
 </file>
 
 <file path=ppt/slides/slide7.xml><?xml version="1.0" encoding="utf-8"?>
+<p:sld xmlns:a="http://schemas.openxmlformats.org/drawingml/2006/main" xmlns:r="http://schemas.openxmlformats.org/officeDocument/2006/relationships" xmlns:p="http://schemas.openxmlformats.org/presentationml/2006/main">
+  <p:cSld>
+    <p:spTree>
+      <p:nvGrpSpPr>
+        <p:cNvPr id="1" name=""/>
+        <p:cNvGrpSpPr/>
+        <p:nvPr/>
+      </p:nvGrpSpPr>
+      <p:grpSpPr>
+        <a:xfrm>
+          <a:off x="0" y="0"/>
+          <a:ext cx="0" cy="0"/>
+          <a:chOff x="0" y="0"/>
+          <a:chExt cx="0" cy="0"/>
+        </a:xfrm>
+      </p:grpSpPr>
+      <p:sp>
+        <p:nvSpPr>
+          <p:cNvPr id="2" name="Title 1">
+            <a:extLst>
+              <a:ext uri="{FF2B5EF4-FFF2-40B4-BE49-F238E27FC236}">
+                <a16:creationId xmlns:a16="http://schemas.microsoft.com/office/drawing/2014/main" id="{FA2E401F-AA5C-734F-591A-E5710420A564}"/>
+              </a:ext>
+            </a:extLst>
+          </p:cNvPr>
+          <p:cNvSpPr>
+            <a:spLocks noGrp="1"/>
+          </p:cNvSpPr>
+          <p:nvPr>
+            <p:ph type="title"/>
+          </p:nvPr>
+        </p:nvSpPr>
+        <p:spPr/>
+        <p:txBody>
+          <a:bodyPr/>
+          <a:lstStyle/>
+          <a:p>
+            <a:r>
+              <a:rPr lang="en-US" dirty="0"/>
+              <a:t>Zero-shot inference</a:t>
+            </a:r>
+          </a:p>
+        </p:txBody>
+      </p:sp>
+      <p:pic>
+        <p:nvPicPr>
+          <p:cNvPr id="5" name="Content Placeholder 4" descr="A graph with lines and numbers&#10;&#10;Description automatically generated">
+            <a:extLst>
+              <a:ext uri="{FF2B5EF4-FFF2-40B4-BE49-F238E27FC236}">
+                <a16:creationId xmlns:a16="http://schemas.microsoft.com/office/drawing/2014/main" id="{CC078C92-BDCB-9338-520D-2247536C6F70}"/>
+              </a:ext>
+            </a:extLst>
+          </p:cNvPr>
+          <p:cNvPicPr>
+            <a:picLocks noGrp="1" noChangeAspect="1"/>
+          </p:cNvPicPr>
+          <p:nvPr>
+            <p:ph idx="1"/>
+          </p:nvPr>
+        </p:nvPicPr>
+        <p:blipFill>
+          <a:blip r:embed="rId2">
+            <a:extLst>
+              <a:ext uri="{28A0092B-C50C-407E-A947-70E740481C1C}">
+                <a14:useLocalDpi xmlns:a14="http://schemas.microsoft.com/office/drawing/2010/main" val="0"/>
+              </a:ext>
+            </a:extLst>
+          </a:blip>
+          <a:stretch>
+            <a:fillRect/>
+          </a:stretch>
+        </p:blipFill>
+        <p:spPr>
+          <a:xfrm>
+            <a:off x="86457" y="1965021"/>
+            <a:ext cx="6124467" cy="3313532"/>
+          </a:xfrm>
+        </p:spPr>
+      </p:pic>
+      <p:pic>
+        <p:nvPicPr>
+          <p:cNvPr id="3" name="Picture 2">
+            <a:extLst>
+              <a:ext uri="{FF2B5EF4-FFF2-40B4-BE49-F238E27FC236}">
+                <a16:creationId xmlns:a16="http://schemas.microsoft.com/office/drawing/2014/main" id="{29623D27-7CBF-1627-7AC6-1F2F71DDCAC9}"/>
+              </a:ext>
+            </a:extLst>
+          </p:cNvPr>
+          <p:cNvPicPr>
+            <a:picLocks noChangeAspect="1"/>
+          </p:cNvPicPr>
+          <p:nvPr/>
+        </p:nvPicPr>
+        <p:blipFill>
+          <a:blip r:embed="rId3"/>
+          <a:stretch>
+            <a:fillRect/>
+          </a:stretch>
+        </p:blipFill>
+        <p:spPr>
+          <a:xfrm>
+            <a:off x="7119430" y="1690688"/>
+            <a:ext cx="4892123" cy="3845463"/>
+          </a:xfrm>
+          <a:prstGeom prst="rect">
+            <a:avLst/>
+          </a:prstGeom>
+        </p:spPr>
+      </p:pic>
+      <p:sp>
+        <p:nvSpPr>
+          <p:cNvPr id="4" name="TextBox 3">
+            <a:extLst>
+              <a:ext uri="{FF2B5EF4-FFF2-40B4-BE49-F238E27FC236}">
+                <a16:creationId xmlns:a16="http://schemas.microsoft.com/office/drawing/2014/main" id="{BBC7F0D1-F3EC-2F54-D68B-00B4790A6E2B}"/>
+              </a:ext>
+            </a:extLst>
+          </p:cNvPr>
+          <p:cNvSpPr txBox="1"/>
+          <p:nvPr/>
+        </p:nvSpPr>
+        <p:spPr>
+          <a:xfrm>
+            <a:off x="2057400" y="5552886"/>
+            <a:ext cx="1805152" cy="369332"/>
+          </a:xfrm>
+          <a:prstGeom prst="rect">
+            <a:avLst/>
+          </a:prstGeom>
+          <a:noFill/>
+        </p:spPr>
+        <p:txBody>
+          <a:bodyPr wrap="square" rtlCol="0">
+            <a:spAutoFit/>
+          </a:bodyPr>
+          <a:lstStyle/>
+          <a:p>
+            <a:r>
+              <a:rPr lang="en-US" dirty="0"/>
+              <a:t>GPT 4o</a:t>
+            </a:r>
+          </a:p>
+        </p:txBody>
+      </p:sp>
+      <p:sp>
+        <p:nvSpPr>
+          <p:cNvPr id="6" name="TextBox 5">
+            <a:extLst>
+              <a:ext uri="{FF2B5EF4-FFF2-40B4-BE49-F238E27FC236}">
+                <a16:creationId xmlns:a16="http://schemas.microsoft.com/office/drawing/2014/main" id="{41E5873C-D653-D618-3FED-4D2F645ACD88}"/>
+              </a:ext>
+            </a:extLst>
+          </p:cNvPr>
+          <p:cNvSpPr txBox="1"/>
+          <p:nvPr/>
+        </p:nvSpPr>
+        <p:spPr>
+          <a:xfrm>
+            <a:off x="8978462" y="5552886"/>
+            <a:ext cx="1805152" cy="369332"/>
+          </a:xfrm>
+          <a:prstGeom prst="rect">
+            <a:avLst/>
+          </a:prstGeom>
+          <a:noFill/>
+        </p:spPr>
+        <p:txBody>
+          <a:bodyPr wrap="square" rtlCol="0">
+            <a:spAutoFit/>
+          </a:bodyPr>
+          <a:lstStyle/>
+          <a:p>
+            <a:r>
+              <a:rPr lang="en-US" dirty="0"/>
+              <a:t>Claude Haiku</a:t>
+            </a:r>
+          </a:p>
+        </p:txBody>
+      </p:sp>
+    </p:spTree>
+    <p:extLst>
+      <p:ext uri="{BB962C8B-B14F-4D97-AF65-F5344CB8AC3E}">
+        <p14:creationId xmlns:p14="http://schemas.microsoft.com/office/powerpoint/2010/main" val="2086732500"/>
+      </p:ext>
+    </p:extLst>
+  </p:cSld>
+  <p:clrMapOvr>
+    <a:masterClrMapping/>
+  </p:clrMapOvr>
+</p:sld>
+</file>
+
+<file path=ppt/slides/slide8.xml><?xml version="1.0" encoding="utf-8"?>
 <p:sld xmlns:a="http://schemas.openxmlformats.org/drawingml/2006/main" xmlns:r="http://schemas.openxmlformats.org/officeDocument/2006/relationships" xmlns:p="http://schemas.openxmlformats.org/presentationml/2006/main">
   <p:cSld>
     <p:spTree>
@@ -12997,7 +13223,7 @@
           <a:p>
             <a:r>
               <a:rPr lang="en-US" dirty="0"/>
-              <a:t>Resources</a:t>
+              <a:t>Remarks</a:t>
             </a:r>
           </a:p>
         </p:txBody>
@@ -13032,7 +13258,7 @@
         </p:blipFill>
         <p:spPr>
           <a:xfrm>
-            <a:off x="7762328" y="1253331"/>
+            <a:off x="4271655" y="1519248"/>
             <a:ext cx="3340860" cy="4351338"/>
           </a:xfrm>
         </p:spPr>
@@ -13041,86 +13267,6 @@
     <p:extLst>
       <p:ext uri="{BB962C8B-B14F-4D97-AF65-F5344CB8AC3E}">
         <p14:creationId xmlns:p14="http://schemas.microsoft.com/office/powerpoint/2010/main" val="2725004908"/>
-      </p:ext>
-    </p:extLst>
-  </p:cSld>
-  <p:clrMapOvr>
-    <a:masterClrMapping/>
-  </p:clrMapOvr>
-</p:sld>
-</file>
-
-<file path=ppt/slides/slide8.xml><?xml version="1.0" encoding="utf-8"?>
-<p:sld xmlns:a="http://schemas.openxmlformats.org/drawingml/2006/main" xmlns:r="http://schemas.openxmlformats.org/officeDocument/2006/relationships" xmlns:p="http://schemas.openxmlformats.org/presentationml/2006/main">
-  <p:cSld>
-    <p:spTree>
-      <p:nvGrpSpPr>
-        <p:cNvPr id="1" name=""/>
-        <p:cNvGrpSpPr/>
-        <p:nvPr/>
-      </p:nvGrpSpPr>
-      <p:grpSpPr>
-        <a:xfrm>
-          <a:off x="0" y="0"/>
-          <a:ext cx="0" cy="0"/>
-          <a:chOff x="0" y="0"/>
-          <a:chExt cx="0" cy="0"/>
-        </a:xfrm>
-      </p:grpSpPr>
-      <p:sp>
-        <p:nvSpPr>
-          <p:cNvPr id="2" name="Title 1">
-            <a:extLst>
-              <a:ext uri="{FF2B5EF4-FFF2-40B4-BE49-F238E27FC236}">
-                <a16:creationId xmlns:a16="http://schemas.microsoft.com/office/drawing/2014/main" id="{A8461F53-1E38-71CA-F676-79C5232E4B8B}"/>
-              </a:ext>
-            </a:extLst>
-          </p:cNvPr>
-          <p:cNvSpPr>
-            <a:spLocks noGrp="1"/>
-          </p:cNvSpPr>
-          <p:nvPr>
-            <p:ph type="title"/>
-          </p:nvPr>
-        </p:nvSpPr>
-        <p:spPr/>
-        <p:txBody>
-          <a:bodyPr/>
-          <a:lstStyle/>
-          <a:p>
-            <a:endParaRPr lang="en-US"/>
-          </a:p>
-        </p:txBody>
-      </p:sp>
-      <p:sp>
-        <p:nvSpPr>
-          <p:cNvPr id="3" name="Content Placeholder 2">
-            <a:extLst>
-              <a:ext uri="{FF2B5EF4-FFF2-40B4-BE49-F238E27FC236}">
-                <a16:creationId xmlns:a16="http://schemas.microsoft.com/office/drawing/2014/main" id="{432D617C-D403-7676-823A-265B78F86BE8}"/>
-              </a:ext>
-            </a:extLst>
-          </p:cNvPr>
-          <p:cNvSpPr>
-            <a:spLocks noGrp="1"/>
-          </p:cNvSpPr>
-          <p:nvPr>
-            <p:ph idx="1"/>
-          </p:nvPr>
-        </p:nvSpPr>
-        <p:spPr/>
-        <p:txBody>
-          <a:bodyPr/>
-          <a:lstStyle/>
-          <a:p>
-            <a:endParaRPr lang="en-US"/>
-          </a:p>
-        </p:txBody>
-      </p:sp>
-    </p:spTree>
-    <p:extLst>
-      <p:ext uri="{BB962C8B-B14F-4D97-AF65-F5344CB8AC3E}">
-        <p14:creationId xmlns:p14="http://schemas.microsoft.com/office/powerpoint/2010/main" val="697072991"/>
       </p:ext>
     </p:extLst>
   </p:cSld>

</xml_diff>